<commit_message>
face compare with min e_distance and modify overview.png
</commit_message>
<xml_diff>
--- a/introduction/Dlib_Face_recognition_by_coneypo.pptx
+++ b/introduction/Dlib_Face_recognition_by_coneypo.pptx
@@ -244,7 +244,7 @@
           <a:p>
             <a:fld id="{181EB48F-690E-47BC-A710-8A96CE427C21}" type="datetimeFigureOut">
               <a:rPr lang="zh-CN" altLang="en-US" smtClean="0"/>
-              <a:t>2019/3/23</a:t>
+              <a:t>2019/4/9</a:t>
             </a:fld>
             <a:endParaRPr lang="zh-CN" altLang="en-US"/>
           </a:p>
@@ -414,7 +414,7 @@
           <a:p>
             <a:fld id="{181EB48F-690E-47BC-A710-8A96CE427C21}" type="datetimeFigureOut">
               <a:rPr lang="zh-CN" altLang="en-US" smtClean="0"/>
-              <a:t>2019/3/23</a:t>
+              <a:t>2019/4/9</a:t>
             </a:fld>
             <a:endParaRPr lang="zh-CN" altLang="en-US"/>
           </a:p>
@@ -594,7 +594,7 @@
           <a:p>
             <a:fld id="{181EB48F-690E-47BC-A710-8A96CE427C21}" type="datetimeFigureOut">
               <a:rPr lang="zh-CN" altLang="en-US" smtClean="0"/>
-              <a:t>2019/3/23</a:t>
+              <a:t>2019/4/9</a:t>
             </a:fld>
             <a:endParaRPr lang="zh-CN" altLang="en-US"/>
           </a:p>
@@ -764,7 +764,7 @@
           <a:p>
             <a:fld id="{181EB48F-690E-47BC-A710-8A96CE427C21}" type="datetimeFigureOut">
               <a:rPr lang="zh-CN" altLang="en-US" smtClean="0"/>
-              <a:t>2019/3/23</a:t>
+              <a:t>2019/4/9</a:t>
             </a:fld>
             <a:endParaRPr lang="zh-CN" altLang="en-US"/>
           </a:p>
@@ -1010,7 +1010,7 @@
           <a:p>
             <a:fld id="{181EB48F-690E-47BC-A710-8A96CE427C21}" type="datetimeFigureOut">
               <a:rPr lang="zh-CN" altLang="en-US" smtClean="0"/>
-              <a:t>2019/3/23</a:t>
+              <a:t>2019/4/9</a:t>
             </a:fld>
             <a:endParaRPr lang="zh-CN" altLang="en-US"/>
           </a:p>
@@ -1242,7 +1242,7 @@
           <a:p>
             <a:fld id="{181EB48F-690E-47BC-A710-8A96CE427C21}" type="datetimeFigureOut">
               <a:rPr lang="zh-CN" altLang="en-US" smtClean="0"/>
-              <a:t>2019/3/23</a:t>
+              <a:t>2019/4/9</a:t>
             </a:fld>
             <a:endParaRPr lang="zh-CN" altLang="en-US"/>
           </a:p>
@@ -1609,7 +1609,7 @@
           <a:p>
             <a:fld id="{181EB48F-690E-47BC-A710-8A96CE427C21}" type="datetimeFigureOut">
               <a:rPr lang="zh-CN" altLang="en-US" smtClean="0"/>
-              <a:t>2019/3/23</a:t>
+              <a:t>2019/4/9</a:t>
             </a:fld>
             <a:endParaRPr lang="zh-CN" altLang="en-US"/>
           </a:p>
@@ -1727,7 +1727,7 @@
           <a:p>
             <a:fld id="{181EB48F-690E-47BC-A710-8A96CE427C21}" type="datetimeFigureOut">
               <a:rPr lang="zh-CN" altLang="en-US" smtClean="0"/>
-              <a:t>2019/3/23</a:t>
+              <a:t>2019/4/9</a:t>
             </a:fld>
             <a:endParaRPr lang="zh-CN" altLang="en-US"/>
           </a:p>
@@ -1822,7 +1822,7 @@
           <a:p>
             <a:fld id="{181EB48F-690E-47BC-A710-8A96CE427C21}" type="datetimeFigureOut">
               <a:rPr lang="zh-CN" altLang="en-US" smtClean="0"/>
-              <a:t>2019/3/23</a:t>
+              <a:t>2019/4/9</a:t>
             </a:fld>
             <a:endParaRPr lang="zh-CN" altLang="en-US"/>
           </a:p>
@@ -2099,7 +2099,7 @@
           <a:p>
             <a:fld id="{181EB48F-690E-47BC-A710-8A96CE427C21}" type="datetimeFigureOut">
               <a:rPr lang="zh-CN" altLang="en-US" smtClean="0"/>
-              <a:t>2019/3/23</a:t>
+              <a:t>2019/4/9</a:t>
             </a:fld>
             <a:endParaRPr lang="zh-CN" altLang="en-US"/>
           </a:p>
@@ -2352,7 +2352,7 @@
           <a:p>
             <a:fld id="{181EB48F-690E-47BC-A710-8A96CE427C21}" type="datetimeFigureOut">
               <a:rPr lang="zh-CN" altLang="en-US" smtClean="0"/>
-              <a:t>2019/3/23</a:t>
+              <a:t>2019/4/9</a:t>
             </a:fld>
             <a:endParaRPr lang="zh-CN" altLang="en-US"/>
           </a:p>
@@ -2565,7 +2565,7 @@
           <a:p>
             <a:fld id="{181EB48F-690E-47BC-A710-8A96CE427C21}" type="datetimeFigureOut">
               <a:rPr lang="zh-CN" altLang="en-US" smtClean="0"/>
-              <a:t>2019/3/23</a:t>
+              <a:t>2019/4/9</a:t>
             </a:fld>
             <a:endParaRPr lang="zh-CN" altLang="en-US"/>
           </a:p>
@@ -3133,7 +3133,7 @@
         <p:spPr>
           <a:xfrm>
             <a:off x="210172" y="433762"/>
-            <a:ext cx="2755790" cy="369991"/>
+            <a:ext cx="3034190" cy="369991"/>
           </a:xfrm>
         </p:spPr>
         <p:txBody>
@@ -3164,7 +3164,7 @@
                 </a:effectLst>
                 <a:latin typeface="Corbel" panose="020B0503020204020204" pitchFamily="34" charset="0"/>
               </a:rPr>
-              <a:t>get_face_from_camera.py</a:t>
+              <a:t>get_faces_from_camera.py</a:t>
             </a:r>
             <a:endParaRPr lang="zh-CN" altLang="en-US" sz="2000">
               <a:ln w="0"/>
@@ -3193,7 +3193,7 @@
         </p:nvSpPr>
         <p:spPr>
           <a:xfrm>
-            <a:off x="281481" y="5076500"/>
+            <a:off x="295930" y="5524409"/>
             <a:ext cx="2039341" cy="600164"/>
           </a:xfrm>
           <a:prstGeom prst="rect">
@@ -3253,7 +3253,7 @@
         </p:nvSpPr>
         <p:spPr>
           <a:xfrm>
-            <a:off x="3786119" y="176346"/>
+            <a:off x="3724575" y="176346"/>
             <a:ext cx="3244198" cy="884946"/>
           </a:xfrm>
           <a:prstGeom prst="rect">
@@ -3262,7 +3262,7 @@
         </p:spPr>
         <p:txBody>
           <a:bodyPr vert="horz" lIns="91440" tIns="45720" rIns="91440" bIns="45720" rtlCol="0" anchor="ctr">
-            <a:normAutofit fontScale="97500"/>
+            <a:normAutofit fontScale="90000"/>
           </a:bodyPr>
           <a:lstStyle>
             <a:lvl1pPr algn="l" defTabSz="914400" rtl="0" eaLnBrk="1" latinLnBrk="0" hangingPunct="1">
@@ -3290,7 +3290,7 @@
               </a:lnSpc>
             </a:pPr>
             <a:r>
-              <a:rPr lang="en-US" altLang="zh-CN" sz="2000" smtClean="0">
+              <a:rPr lang="en-US" altLang="zh-CN" sz="2000">
                 <a:ln w="0"/>
                 <a:solidFill>
                   <a:schemeClr val="accent1">
@@ -3306,7 +3306,7 @@
                 </a:effectLst>
                 <a:latin typeface="Corbel" panose="020B0503020204020204" pitchFamily="34" charset="0"/>
               </a:rPr>
-              <a:t>get_features_into_CSV.py</a:t>
+              <a:t>features_extraction_to_csv.py</a:t>
             </a:r>
             <a:endParaRPr lang="zh-CN" altLang="en-US" sz="2000">
               <a:ln w="0"/>
@@ -3327,182 +3327,6 @@
           </a:p>
         </p:txBody>
       </p:sp>
-      <p:pic>
-        <p:nvPicPr>
-          <p:cNvPr id="10" name="图片 9"/>
-          <p:cNvPicPr>
-            <a:picLocks noChangeAspect="1"/>
-          </p:cNvPicPr>
-          <p:nvPr/>
-        </p:nvPicPr>
-        <p:blipFill>
-          <a:blip r:embed="rId2"/>
-          <a:stretch>
-            <a:fillRect/>
-          </a:stretch>
-        </p:blipFill>
-        <p:spPr>
-          <a:xfrm>
-            <a:off x="3669847" y="2476787"/>
-            <a:ext cx="3052710" cy="1342398"/>
-          </a:xfrm>
-          <a:prstGeom prst="rect">
-            <a:avLst/>
-          </a:prstGeom>
-          <a:ln>
-            <a:solidFill>
-              <a:schemeClr val="tx1"/>
-            </a:solidFill>
-          </a:ln>
-        </p:spPr>
-      </p:pic>
-      <p:sp>
-        <p:nvSpPr>
-          <p:cNvPr id="12" name="文本框 11"/>
-          <p:cNvSpPr txBox="1"/>
-          <p:nvPr/>
-        </p:nvSpPr>
-        <p:spPr>
-          <a:xfrm>
-            <a:off x="3916044" y="4490298"/>
-            <a:ext cx="2560316" cy="600164"/>
-          </a:xfrm>
-          <a:prstGeom prst="rect">
-            <a:avLst/>
-          </a:prstGeom>
-          <a:noFill/>
-          <a:ln>
-            <a:solidFill>
-              <a:schemeClr val="tx1"/>
-            </a:solidFill>
-          </a:ln>
-        </p:spPr>
-        <p:txBody>
-          <a:bodyPr wrap="none" rtlCol="0">
-            <a:spAutoFit/>
-          </a:bodyPr>
-          <a:lstStyle/>
-          <a:p>
-            <a:pPr>
-              <a:lnSpc>
-                <a:spcPct val="150000"/>
-              </a:lnSpc>
-            </a:pPr>
-            <a:r>
-              <a:rPr lang="zh-CN" altLang="en-US" sz="1100" smtClean="0"/>
-              <a:t>计算</a:t>
-            </a:r>
-            <a:r>
-              <a:rPr lang="en-US" altLang="zh-CN" sz="1100" smtClean="0"/>
-              <a:t> person_X.csv </a:t>
-            </a:r>
-            <a:r>
-              <a:rPr lang="zh-CN" altLang="en-US" sz="1100" smtClean="0"/>
-              <a:t>的 </a:t>
-            </a:r>
-            <a:r>
-              <a:rPr lang="en-US" altLang="zh-CN" sz="1100" smtClean="0"/>
-              <a:t>128D </a:t>
-            </a:r>
-            <a:r>
-              <a:rPr lang="zh-CN" altLang="en-US" sz="1100" smtClean="0"/>
-              <a:t>特征的均值</a:t>
-            </a:r>
-            <a:endParaRPr lang="en-US" altLang="zh-CN" sz="1100" smtClean="0"/>
-          </a:p>
-          <a:p>
-            <a:pPr algn="ctr">
-              <a:lnSpc>
-                <a:spcPct val="150000"/>
-              </a:lnSpc>
-            </a:pPr>
-            <a:r>
-              <a:rPr lang="en-US" altLang="zh-CN" sz="1100" smtClean="0"/>
-              <a:t>(compute_the_mean</a:t>
-            </a:r>
-            <a:r>
-              <a:rPr lang="zh-CN" altLang="en-US" sz="1100" smtClean="0"/>
-              <a:t>函数</a:t>
-            </a:r>
-            <a:r>
-              <a:rPr lang="en-US" altLang="zh-CN" sz="1100" smtClean="0"/>
-              <a:t>)</a:t>
-            </a:r>
-            <a:endParaRPr lang="zh-CN" altLang="en-US" sz="1100"/>
-          </a:p>
-        </p:txBody>
-      </p:sp>
-      <p:sp>
-        <p:nvSpPr>
-          <p:cNvPr id="13" name="文本框 12"/>
-          <p:cNvSpPr txBox="1"/>
-          <p:nvPr/>
-        </p:nvSpPr>
-        <p:spPr>
-          <a:xfrm>
-            <a:off x="5884731" y="3755266"/>
-            <a:ext cx="1441436" cy="346249"/>
-          </a:xfrm>
-          <a:prstGeom prst="rect">
-            <a:avLst/>
-          </a:prstGeom>
-          <a:noFill/>
-        </p:spPr>
-        <p:txBody>
-          <a:bodyPr wrap="square" rtlCol="0">
-            <a:spAutoFit/>
-          </a:bodyPr>
-          <a:lstStyle/>
-          <a:p>
-            <a:pPr>
-              <a:lnSpc>
-                <a:spcPct val="150000"/>
-              </a:lnSpc>
-            </a:pPr>
-            <a:r>
-              <a:rPr lang="en-US" altLang="zh-CN" sz="1100" smtClean="0"/>
-              <a:t>person_X.csv</a:t>
-            </a:r>
-            <a:endParaRPr lang="zh-CN" altLang="en-US" sz="1100"/>
-          </a:p>
-        </p:txBody>
-      </p:sp>
-      <p:cxnSp>
-        <p:nvCxnSpPr>
-          <p:cNvPr id="16" name="直接箭头连接符 15"/>
-          <p:cNvCxnSpPr>
-            <a:stCxn id="10" idx="2"/>
-            <a:endCxn id="12" idx="0"/>
-          </p:cNvCxnSpPr>
-          <p:nvPr/>
-        </p:nvCxnSpPr>
-        <p:spPr>
-          <a:xfrm>
-            <a:off x="5196202" y="3819185"/>
-            <a:ext cx="0" cy="671113"/>
-          </a:xfrm>
-          <a:prstGeom prst="straightConnector1">
-            <a:avLst/>
-          </a:prstGeom>
-          <a:ln>
-            <a:tailEnd type="triangle"/>
-          </a:ln>
-        </p:spPr>
-        <p:style>
-          <a:lnRef idx="1">
-            <a:schemeClr val="dk1"/>
-          </a:lnRef>
-          <a:fillRef idx="0">
-            <a:schemeClr val="dk1"/>
-          </a:fillRef>
-          <a:effectRef idx="0">
-            <a:schemeClr val="dk1"/>
-          </a:effectRef>
-          <a:fontRef idx="minor">
-            <a:schemeClr val="tx1"/>
-          </a:fontRef>
-        </p:style>
-      </p:cxnSp>
       <p:cxnSp>
         <p:nvCxnSpPr>
           <p:cNvPr id="18" name="直接箭头连接符 17"/>
@@ -3513,9 +3337,9 @@
           <p:nvPr/>
         </p:nvCxnSpPr>
         <p:spPr>
-          <a:xfrm>
-            <a:off x="1531832" y="3147986"/>
-            <a:ext cx="0" cy="543083"/>
+          <a:xfrm flipH="1">
+            <a:off x="1525305" y="3147986"/>
+            <a:ext cx="6527" cy="1017586"/>
           </a:xfrm>
           <a:prstGeom prst="straightConnector1">
             <a:avLst/>
@@ -3577,15 +3401,12 @@
       <p:cxnSp>
         <p:nvCxnSpPr>
           <p:cNvPr id="22" name="直接箭头连接符 21"/>
-          <p:cNvCxnSpPr>
-            <a:stCxn id="12" idx="2"/>
-            <a:endCxn id="24" idx="0"/>
-          </p:cNvCxnSpPr>
+          <p:cNvCxnSpPr/>
           <p:nvPr/>
         </p:nvCxnSpPr>
         <p:spPr>
           <a:xfrm>
-            <a:off x="5196202" y="5090462"/>
+            <a:off x="5185737" y="3412652"/>
             <a:ext cx="0" cy="676693"/>
           </a:xfrm>
           <a:prstGeom prst="straightConnector1">
@@ -3618,7 +3439,7 @@
         </p:nvSpPr>
         <p:spPr>
           <a:xfrm>
-            <a:off x="3939287" y="5767155"/>
+            <a:off x="3968429" y="2655031"/>
             <a:ext cx="2513830" cy="600164"/>
           </a:xfrm>
           <a:prstGeom prst="rect">
@@ -4475,8 +4296,8 @@
         </p:nvSpPr>
         <p:spPr>
           <a:xfrm>
-            <a:off x="1908714" y="3147986"/>
-            <a:ext cx="949299" cy="346249"/>
+            <a:off x="1891130" y="3104026"/>
+            <a:ext cx="971741" cy="320409"/>
           </a:xfrm>
           <a:prstGeom prst="rect">
             <a:avLst/>
@@ -4495,14 +4316,14 @@
               </a:lnSpc>
             </a:pPr>
             <a:r>
-              <a:rPr lang="en-US" altLang="zh-CN" sz="1100" smtClean="0"/>
+              <a:rPr lang="en-US" altLang="zh-CN" sz="1100" b="1" smtClean="0"/>
               <a:t>camera </a:t>
             </a:r>
             <a:r>
-              <a:rPr lang="zh-CN" altLang="en-US" sz="1100" smtClean="0"/>
+              <a:rPr lang="zh-CN" altLang="en-US" sz="1100" b="1" smtClean="0"/>
               <a:t>窗口</a:t>
             </a:r>
-            <a:endParaRPr lang="zh-CN" altLang="en-US" sz="1100"/>
+            <a:endParaRPr lang="zh-CN" altLang="en-US" sz="1100" b="1"/>
           </a:p>
         </p:txBody>
       </p:sp>
@@ -4926,7 +4747,7 @@
           <p:nvPr/>
         </p:nvPicPr>
         <p:blipFill>
-          <a:blip r:embed="rId3" cstate="print">
+          <a:blip r:embed="rId2" cstate="print">
             <a:extLst>
               <a:ext uri="{28A0092B-C50C-407E-A947-70E740481C1C}">
                 <a14:useLocalDpi xmlns:a14="http://schemas.microsoft.com/office/drawing/2010/main" val="0"/>
@@ -4972,14 +4793,14 @@
           <p:nvPr/>
         </p:nvPicPr>
         <p:blipFill>
-          <a:blip r:embed="rId4"/>
+          <a:blip r:embed="rId3"/>
           <a:stretch>
             <a:fillRect/>
           </a:stretch>
         </p:blipFill>
         <p:spPr>
           <a:xfrm>
-            <a:off x="295930" y="3691069"/>
+            <a:off x="289403" y="4165572"/>
             <a:ext cx="2471804" cy="1302814"/>
           </a:xfrm>
           <a:prstGeom prst="rect">
@@ -4997,7 +4818,6 @@
           <p:cNvPr id="104" name="直接箭头连接符 103"/>
           <p:cNvCxnSpPr>
             <a:stCxn id="57" idx="2"/>
-            <a:endCxn id="10" idx="0"/>
           </p:cNvCxnSpPr>
           <p:nvPr/>
         </p:nvCxnSpPr>
@@ -5028,6 +4848,65 @@
           </a:fontRef>
         </p:style>
       </p:cxnSp>
+      <p:pic>
+        <p:nvPicPr>
+          <p:cNvPr id="3" name="图片 2"/>
+          <p:cNvPicPr>
+            <a:picLocks noChangeAspect="1"/>
+          </p:cNvPicPr>
+          <p:nvPr/>
+        </p:nvPicPr>
+        <p:blipFill>
+          <a:blip r:embed="rId4"/>
+          <a:stretch>
+            <a:fillRect/>
+          </a:stretch>
+        </p:blipFill>
+        <p:spPr>
+          <a:xfrm>
+            <a:off x="3244362" y="4242547"/>
+            <a:ext cx="4158769" cy="317761"/>
+          </a:xfrm>
+          <a:prstGeom prst="rect">
+            <a:avLst/>
+          </a:prstGeom>
+        </p:spPr>
+      </p:pic>
+      <p:sp>
+        <p:nvSpPr>
+          <p:cNvPr id="41" name="文本框 40"/>
+          <p:cNvSpPr txBox="1"/>
+          <p:nvPr/>
+        </p:nvSpPr>
+        <p:spPr>
+          <a:xfrm>
+            <a:off x="1575492" y="3550258"/>
+            <a:ext cx="1101584" cy="346249"/>
+          </a:xfrm>
+          <a:prstGeom prst="rect">
+            <a:avLst/>
+          </a:prstGeom>
+          <a:noFill/>
+        </p:spPr>
+        <p:txBody>
+          <a:bodyPr wrap="none" rtlCol="0">
+            <a:spAutoFit/>
+          </a:bodyPr>
+          <a:lstStyle/>
+          <a:p>
+            <a:pPr>
+              <a:lnSpc>
+                <a:spcPct val="150000"/>
+              </a:lnSpc>
+            </a:pPr>
+            <a:r>
+              <a:rPr lang="en-US" altLang="zh-CN" sz="1100" smtClean="0"/>
+              <a:t>press ‘n’ and ‘s’</a:t>
+            </a:r>
+            <a:endParaRPr lang="zh-CN" altLang="en-US" sz="1100"/>
+          </a:p>
+        </p:txBody>
+      </p:sp>
     </p:spTree>
     <p:extLst>
       <p:ext uri="{BB962C8B-B14F-4D97-AF65-F5344CB8AC3E}">

</xml_diff>